<commit_message>
Conquistas até o Atual Momento
</commit_message>
<xml_diff>
--- a/Conquistas/Conquistas.pptx
+++ b/Conquistas/Conquistas.pptx
@@ -11,6 +11,7 @@
     <p:sldId id="259" r:id="rId5"/>
     <p:sldId id="260" r:id="rId6"/>
     <p:sldId id="261" r:id="rId7"/>
+    <p:sldId id="262" r:id="rId8"/>
   </p:sldIdLst>
   <p:sldSz cx="12192000" cy="6858000"/>
   <p:notesSz cx="6858000" cy="9144000"/>
@@ -109,6 +110,11 @@
       </a:defRPr>
     </a:lvl9pPr>
   </p:defaultTextStyle>
+  <p:extLst>
+    <p:ext uri="{EFAFB233-063F-42B5-8137-9DF3F51BA10A}">
+      <p15:sldGuideLst xmlns:p15="http://schemas.microsoft.com/office/powerpoint/2012/main"/>
+    </p:ext>
+  </p:extLst>
 </p:presentation>
 </file>
 
@@ -4090,6 +4096,95 @@
 </p:sld>
 </file>
 
+<file path=ppt/slides/slide7.xml><?xml version="1.0" encoding="utf-8"?>
+<p:sld xmlns:a="http://schemas.openxmlformats.org/drawingml/2006/main" xmlns:r="http://schemas.openxmlformats.org/officeDocument/2006/relationships" xmlns:p="http://schemas.openxmlformats.org/presentationml/2006/main">
+  <p:cSld>
+    <p:spTree>
+      <p:nvGrpSpPr>
+        <p:cNvPr id="1" name=""/>
+        <p:cNvGrpSpPr/>
+        <p:nvPr/>
+      </p:nvGrpSpPr>
+      <p:grpSpPr>
+        <a:xfrm>
+          <a:off x="0" y="0"/>
+          <a:ext cx="0" cy="0"/>
+          <a:chOff x="0" y="0"/>
+          <a:chExt cx="0" cy="0"/>
+        </a:xfrm>
+      </p:grpSpPr>
+      <p:sp>
+        <p:nvSpPr>
+          <p:cNvPr id="2" name="Título 1">
+            <a:extLst>
+              <a:ext uri="{FF2B5EF4-FFF2-40B4-BE49-F238E27FC236}">
+                <a16:creationId xmlns:a16="http://schemas.microsoft.com/office/drawing/2014/main" id="{9D8139FF-43AD-4214-92BE-3D8445AF1AD3}"/>
+              </a:ext>
+            </a:extLst>
+          </p:cNvPr>
+          <p:cNvSpPr>
+            <a:spLocks noGrp="1"/>
+          </p:cNvSpPr>
+          <p:nvPr>
+            <p:ph type="title"/>
+          </p:nvPr>
+        </p:nvSpPr>
+        <p:spPr/>
+        <p:txBody>
+          <a:bodyPr>
+            <a:normAutofit/>
+          </a:bodyPr>
+          <a:lstStyle/>
+          <a:p>
+            <a:r>
+              <a:rPr lang="pt-BR" dirty="0"/>
+              <a:t>Criando seu Primeiro Repositório no GitHub Para Compartilhar Seu Progresso</a:t>
+            </a:r>
+          </a:p>
+        </p:txBody>
+      </p:sp>
+      <p:pic>
+        <p:nvPicPr>
+          <p:cNvPr id="5" name="Espaço Reservado para Conteúdo 4">
+            <a:extLst>
+              <a:ext uri="{FF2B5EF4-FFF2-40B4-BE49-F238E27FC236}">
+                <a16:creationId xmlns:a16="http://schemas.microsoft.com/office/drawing/2014/main" id="{3BAF2B18-507B-48C7-BB26-091E70EBB6C2}"/>
+              </a:ext>
+            </a:extLst>
+          </p:cNvPr>
+          <p:cNvPicPr>
+            <a:picLocks noGrp="1" noChangeAspect="1"/>
+          </p:cNvPicPr>
+          <p:nvPr>
+            <p:ph idx="1"/>
+          </p:nvPr>
+        </p:nvPicPr>
+        <p:blipFill>
+          <a:blip r:embed="rId2"/>
+          <a:stretch>
+            <a:fillRect/>
+          </a:stretch>
+        </p:blipFill>
+        <p:spPr>
+          <a:xfrm>
+            <a:off x="3823807" y="2016125"/>
+            <a:ext cx="4858711" cy="3449638"/>
+          </a:xfrm>
+        </p:spPr>
+      </p:pic>
+    </p:spTree>
+    <p:extLst>
+      <p:ext uri="{BB962C8B-B14F-4D97-AF65-F5344CB8AC3E}">
+        <p14:creationId xmlns:p14="http://schemas.microsoft.com/office/powerpoint/2010/main" val="680901180"/>
+      </p:ext>
+    </p:extLst>
+  </p:cSld>
+  <p:clrMapOvr>
+    <a:masterClrMapping/>
+  </p:clrMapOvr>
+</p:sld>
+</file>
+
 <file path=ppt/theme/theme1.xml><?xml version="1.0" encoding="utf-8"?>
 <a:theme xmlns:a="http://schemas.openxmlformats.org/drawingml/2006/main" name="Galeria">
   <a:themeElements>

</xml_diff>

<commit_message>
Progresso Até o Atual Momento.
</commit_message>
<xml_diff>
--- a/Conquistas/Conquistas.pptx
+++ b/Conquistas/Conquistas.pptx
@@ -15,6 +15,7 @@
     <p:sldId id="263" r:id="rId9"/>
     <p:sldId id="264" r:id="rId10"/>
     <p:sldId id="265" r:id="rId11"/>
+    <p:sldId id="266" r:id="rId12"/>
   </p:sldIdLst>
   <p:sldSz cx="12192000" cy="6858000"/>
   <p:notesSz cx="6858000" cy="9144000"/>
@@ -260,7 +261,7 @@
           <a:p>
             <a:fld id="{48A87A34-81AB-432B-8DAE-1953F412C126}" type="datetimeFigureOut">
               <a:rPr lang="en-US" dirty="0"/>
-              <a:t>12/12/2021</a:t>
+              <a:t>12/27/2021</a:t>
             </a:fld>
             <a:endParaRPr lang="en-US" dirty="0"/>
           </a:p>
@@ -466,7 +467,7 @@
           <a:p>
             <a:fld id="{48A87A34-81AB-432B-8DAE-1953F412C126}" type="datetimeFigureOut">
               <a:rPr lang="en-US" dirty="0"/>
-              <a:t>12/12/2021</a:t>
+              <a:t>12/27/2021</a:t>
             </a:fld>
             <a:endParaRPr lang="en-US" dirty="0"/>
           </a:p>
@@ -676,7 +677,7 @@
           <a:p>
             <a:fld id="{48A87A34-81AB-432B-8DAE-1953F412C126}" type="datetimeFigureOut">
               <a:rPr lang="en-US" dirty="0"/>
-              <a:t>12/12/2021</a:t>
+              <a:t>12/27/2021</a:t>
             </a:fld>
             <a:endParaRPr lang="en-US" dirty="0"/>
           </a:p>
@@ -872,7 +873,7 @@
           <a:p>
             <a:fld id="{48A87A34-81AB-432B-8DAE-1953F412C126}" type="datetimeFigureOut">
               <a:rPr lang="en-US" dirty="0"/>
-              <a:t>12/12/2021</a:t>
+              <a:t>12/27/2021</a:t>
             </a:fld>
             <a:endParaRPr lang="en-US" dirty="0"/>
           </a:p>
@@ -1146,7 +1147,7 @@
           <a:p>
             <a:fld id="{48A87A34-81AB-432B-8DAE-1953F412C126}" type="datetimeFigureOut">
               <a:rPr lang="en-US" dirty="0"/>
-              <a:t>12/12/2021</a:t>
+              <a:t>12/27/2021</a:t>
             </a:fld>
             <a:endParaRPr lang="en-US" dirty="0"/>
           </a:p>
@@ -1409,7 +1410,7 @@
           <a:p>
             <a:fld id="{48A87A34-81AB-432B-8DAE-1953F412C126}" type="datetimeFigureOut">
               <a:rPr lang="en-US" dirty="0"/>
-              <a:t>12/12/2021</a:t>
+              <a:t>12/27/2021</a:t>
             </a:fld>
             <a:endParaRPr lang="en-US" dirty="0"/>
           </a:p>
@@ -1820,7 +1821,7 @@
           <a:p>
             <a:fld id="{48A87A34-81AB-432B-8DAE-1953F412C126}" type="datetimeFigureOut">
               <a:rPr lang="en-US" dirty="0"/>
-              <a:t>12/12/2021</a:t>
+              <a:t>12/27/2021</a:t>
             </a:fld>
             <a:endParaRPr lang="en-US" dirty="0"/>
           </a:p>
@@ -1964,7 +1965,7 @@
           <a:p>
             <a:fld id="{48A87A34-81AB-432B-8DAE-1953F412C126}" type="datetimeFigureOut">
               <a:rPr lang="en-US" dirty="0"/>
-              <a:t>12/12/2021</a:t>
+              <a:t>12/27/2021</a:t>
             </a:fld>
             <a:endParaRPr lang="en-US" dirty="0"/>
           </a:p>
@@ -2085,7 +2086,7 @@
           <a:p>
             <a:fld id="{48A87A34-81AB-432B-8DAE-1953F412C126}" type="datetimeFigureOut">
               <a:rPr lang="en-US" dirty="0"/>
-              <a:t>12/12/2021</a:t>
+              <a:t>12/27/2021</a:t>
             </a:fld>
             <a:endParaRPr lang="en-US" dirty="0"/>
           </a:p>
@@ -2331,7 +2332,7 @@
           <a:p>
             <a:fld id="{48A87A34-81AB-432B-8DAE-1953F412C126}" type="datetimeFigureOut">
               <a:rPr lang="en-US" dirty="0"/>
-              <a:t>12/12/2021</a:t>
+              <a:t>12/27/2021</a:t>
             </a:fld>
             <a:endParaRPr lang="en-US" dirty="0"/>
           </a:p>
@@ -2772,7 +2773,7 @@
             <a:fld id="{48A87A34-81AB-432B-8DAE-1953F412C126}" type="datetimeFigureOut">
               <a:rPr lang="en-US" dirty="0"/>
               <a:pPr/>
-              <a:t>12/12/2021</a:t>
+              <a:t>12/27/2021</a:t>
             </a:fld>
             <a:endParaRPr lang="en-US" dirty="0"/>
           </a:p>
@@ -3095,7 +3096,7 @@
             <a:fld id="{48A87A34-81AB-432B-8DAE-1953F412C126}" type="datetimeFigureOut">
               <a:rPr lang="en-US" dirty="0"/>
               <a:pPr/>
-              <a:t>12/12/2021</a:t>
+              <a:t>12/27/2021</a:t>
             </a:fld>
             <a:endParaRPr lang="en-US" dirty="0"/>
           </a:p>
@@ -3733,6 +3734,93 @@
 </p:sld>
 </file>
 
+<file path=ppt/slides/slide11.xml><?xml version="1.0" encoding="utf-8"?>
+<p:sld xmlns:a="http://schemas.openxmlformats.org/drawingml/2006/main" xmlns:r="http://schemas.openxmlformats.org/officeDocument/2006/relationships" xmlns:p="http://schemas.openxmlformats.org/presentationml/2006/main">
+  <p:cSld>
+    <p:spTree>
+      <p:nvGrpSpPr>
+        <p:cNvPr id="1" name=""/>
+        <p:cNvGrpSpPr/>
+        <p:nvPr/>
+      </p:nvGrpSpPr>
+      <p:grpSpPr>
+        <a:xfrm>
+          <a:off x="0" y="0"/>
+          <a:ext cx="0" cy="0"/>
+          <a:chOff x="0" y="0"/>
+          <a:chExt cx="0" cy="0"/>
+        </a:xfrm>
+      </p:grpSpPr>
+      <p:sp>
+        <p:nvSpPr>
+          <p:cNvPr id="2" name="Título 1">
+            <a:extLst>
+              <a:ext uri="{FF2B5EF4-FFF2-40B4-BE49-F238E27FC236}">
+                <a16:creationId xmlns:a16="http://schemas.microsoft.com/office/drawing/2014/main" id="{208E16BE-B881-4923-AE61-94D5CEA76680}"/>
+              </a:ext>
+            </a:extLst>
+          </p:cNvPr>
+          <p:cNvSpPr>
+            <a:spLocks noGrp="1"/>
+          </p:cNvSpPr>
+          <p:nvPr>
+            <p:ph type="title"/>
+          </p:nvPr>
+        </p:nvSpPr>
+        <p:spPr/>
+        <p:txBody>
+          <a:bodyPr/>
+          <a:lstStyle/>
+          <a:p>
+            <a:r>
+              <a:rPr lang="pt-BR" dirty="0"/>
+              <a:t>Programando com Orientação a Objeto com C#</a:t>
+            </a:r>
+          </a:p>
+        </p:txBody>
+      </p:sp>
+      <p:pic>
+        <p:nvPicPr>
+          <p:cNvPr id="9" name="Espaço Reservado para Conteúdo 8">
+            <a:extLst>
+              <a:ext uri="{FF2B5EF4-FFF2-40B4-BE49-F238E27FC236}">
+                <a16:creationId xmlns:a16="http://schemas.microsoft.com/office/drawing/2014/main" id="{0D20B898-6A49-4FA3-BB6B-7473B3E0E781}"/>
+              </a:ext>
+            </a:extLst>
+          </p:cNvPr>
+          <p:cNvPicPr>
+            <a:picLocks noGrp="1" noChangeAspect="1"/>
+          </p:cNvPicPr>
+          <p:nvPr>
+            <p:ph idx="1"/>
+          </p:nvPr>
+        </p:nvPicPr>
+        <p:blipFill>
+          <a:blip r:embed="rId2"/>
+          <a:stretch>
+            <a:fillRect/>
+          </a:stretch>
+        </p:blipFill>
+        <p:spPr>
+          <a:xfrm rot="5400000">
+            <a:off x="4527550" y="1291029"/>
+            <a:ext cx="3449638" cy="4901416"/>
+          </a:xfrm>
+        </p:spPr>
+      </p:pic>
+    </p:spTree>
+    <p:extLst>
+      <p:ext uri="{BB962C8B-B14F-4D97-AF65-F5344CB8AC3E}">
+        <p14:creationId xmlns:p14="http://schemas.microsoft.com/office/powerpoint/2010/main" val="3302445024"/>
+      </p:ext>
+    </p:extLst>
+  </p:cSld>
+  <p:clrMapOvr>
+    <a:masterClrMapping/>
+  </p:clrMapOvr>
+</p:sld>
+</file>
+
 <file path=ppt/slides/slide2.xml><?xml version="1.0" encoding="utf-8"?>
 <p:sld xmlns:a="http://schemas.openxmlformats.org/drawingml/2006/main" xmlns:r="http://schemas.openxmlformats.org/officeDocument/2006/relationships" xmlns:p="http://schemas.openxmlformats.org/presentationml/2006/main">
   <p:cSld>

</xml_diff>